<commit_message>
KFold continue implementation [WiP]
</commit_message>
<xml_diff>
--- a/Powerpoints/6 Panel Models.pptx
+++ b/Powerpoints/6 Panel Models.pptx
@@ -14325,7 +14325,7 @@
             <p:spPr/>
             <p:txBody>
               <a:bodyPr>
-                <a:normAutofit lnSpcReduction="10000"/>
+                <a:normAutofit/>
               </a:bodyPr>
               <a:lstStyle/>
               <a:p>
@@ -14506,7 +14506,7 @@
               <a:blipFill>
                 <a:blip r:embed="rId2"/>
                 <a:stretch>
-                  <a:fillRect l="-1206" t="-3198" r="-1327"/>
+                  <a:fillRect l="-1206" t="-2326" r="-1327" b="-2907"/>
                 </a:stretch>
               </a:blipFill>
             </p:spPr>

</xml_diff>